<commit_message>
Update Presentación de Proyecto Pitch1.pptx
</commit_message>
<xml_diff>
--- a/Presentaciones del proyecto/Presentación de Proyecto Pitch1.pptx
+++ b/Presentaciones del proyecto/Presentación de Proyecto Pitch1.pptx
@@ -261,7 +261,7 @@
           <a:p>
             <a:fld id="{88369B9F-131C-2846-AB8F-CEE154B4CAEB}" type="datetimeFigureOut">
               <a:rPr lang="es-CO" smtClean="0"/>
-              <a:t>24/05/2023</a:t>
+              <a:t>25/05/2023</a:t>
             </a:fld>
             <a:endParaRPr lang="es-CO"/>
           </a:p>
@@ -438,7 +438,7 @@
           <a:p>
             <a:fld id="{9660CB96-A603-FF42-AE46-F5F75F80A67B}" type="datetimeFigureOut">
               <a:rPr lang="es-CO" smtClean="0"/>
-              <a:t>24/05/2023</a:t>
+              <a:t>25/05/2023</a:t>
             </a:fld>
             <a:endParaRPr lang="es-CO"/>
           </a:p>
@@ -939,7 +939,7 @@
           <a:p>
             <a:fld id="{BD986248-06F7-A441-A47A-264EBD310E11}" type="datetimeFigureOut">
               <a:rPr lang="es-CO" smtClean="0"/>
-              <a:t>24/05/2023</a:t>
+              <a:t>25/05/2023</a:t>
             </a:fld>
             <a:endParaRPr lang="es-CO"/>
           </a:p>
@@ -1139,7 +1139,7 @@
           <a:p>
             <a:fld id="{BD986248-06F7-A441-A47A-264EBD310E11}" type="datetimeFigureOut">
               <a:rPr lang="es-CO" smtClean="0"/>
-              <a:t>24/05/2023</a:t>
+              <a:t>25/05/2023</a:t>
             </a:fld>
             <a:endParaRPr lang="es-CO"/>
           </a:p>
@@ -1349,7 +1349,7 @@
           <a:p>
             <a:fld id="{BD986248-06F7-A441-A47A-264EBD310E11}" type="datetimeFigureOut">
               <a:rPr lang="es-CO" smtClean="0"/>
-              <a:t>24/05/2023</a:t>
+              <a:t>25/05/2023</a:t>
             </a:fld>
             <a:endParaRPr lang="es-CO"/>
           </a:p>
@@ -1612,7 +1612,7 @@
           <a:p>
             <a:fld id="{BD986248-06F7-A441-A47A-264EBD310E11}" type="datetimeFigureOut">
               <a:rPr lang="es-CO" smtClean="0"/>
-              <a:t>24/05/2023</a:t>
+              <a:t>25/05/2023</a:t>
             </a:fld>
             <a:endParaRPr lang="es-CO"/>
           </a:p>
@@ -1812,7 +1812,7 @@
           <a:p>
             <a:fld id="{BD986248-06F7-A441-A47A-264EBD310E11}" type="datetimeFigureOut">
               <a:rPr lang="es-CO" smtClean="0"/>
-              <a:t>24/05/2023</a:t>
+              <a:t>25/05/2023</a:t>
             </a:fld>
             <a:endParaRPr lang="es-CO"/>
           </a:p>
@@ -2088,7 +2088,7 @@
           <a:p>
             <a:fld id="{BD986248-06F7-A441-A47A-264EBD310E11}" type="datetimeFigureOut">
               <a:rPr lang="es-CO" smtClean="0"/>
-              <a:t>24/05/2023</a:t>
+              <a:t>25/05/2023</a:t>
             </a:fld>
             <a:endParaRPr lang="es-CO"/>
           </a:p>
@@ -2356,7 +2356,7 @@
           <a:p>
             <a:fld id="{BD986248-06F7-A441-A47A-264EBD310E11}" type="datetimeFigureOut">
               <a:rPr lang="es-CO" smtClean="0"/>
-              <a:t>24/05/2023</a:t>
+              <a:t>25/05/2023</a:t>
             </a:fld>
             <a:endParaRPr lang="es-CO"/>
           </a:p>
@@ -2771,7 +2771,7 @@
           <a:p>
             <a:fld id="{BD986248-06F7-A441-A47A-264EBD310E11}" type="datetimeFigureOut">
               <a:rPr lang="es-CO" smtClean="0"/>
-              <a:t>24/05/2023</a:t>
+              <a:t>25/05/2023</a:t>
             </a:fld>
             <a:endParaRPr lang="es-CO"/>
           </a:p>
@@ -2913,7 +2913,7 @@
           <a:p>
             <a:fld id="{BD986248-06F7-A441-A47A-264EBD310E11}" type="datetimeFigureOut">
               <a:rPr lang="es-CO" smtClean="0"/>
-              <a:t>24/05/2023</a:t>
+              <a:t>25/05/2023</a:t>
             </a:fld>
             <a:endParaRPr lang="es-CO"/>
           </a:p>
@@ -3026,7 +3026,7 @@
           <a:p>
             <a:fld id="{BD986248-06F7-A441-A47A-264EBD310E11}" type="datetimeFigureOut">
               <a:rPr lang="es-CO" smtClean="0"/>
-              <a:t>24/05/2023</a:t>
+              <a:t>25/05/2023</a:t>
             </a:fld>
             <a:endParaRPr lang="es-CO"/>
           </a:p>
@@ -3339,7 +3339,7 @@
           <a:p>
             <a:fld id="{BD986248-06F7-A441-A47A-264EBD310E11}" type="datetimeFigureOut">
               <a:rPr lang="es-CO" smtClean="0"/>
-              <a:t>24/05/2023</a:t>
+              <a:t>25/05/2023</a:t>
             </a:fld>
             <a:endParaRPr lang="es-CO"/>
           </a:p>
@@ -3628,7 +3628,7 @@
           <a:p>
             <a:fld id="{BD986248-06F7-A441-A47A-264EBD310E11}" type="datetimeFigureOut">
               <a:rPr lang="es-CO" smtClean="0"/>
-              <a:t>24/05/2023</a:t>
+              <a:t>25/05/2023</a:t>
             </a:fld>
             <a:endParaRPr lang="es-CO"/>
           </a:p>
@@ -3871,7 +3871,7 @@
           <a:p>
             <a:fld id="{BD986248-06F7-A441-A47A-264EBD310E11}" type="datetimeFigureOut">
               <a:rPr lang="es-CO" smtClean="0"/>
-              <a:t>24/05/2023</a:t>
+              <a:t>25/05/2023</a:t>
             </a:fld>
             <a:endParaRPr lang="es-CO"/>
           </a:p>
@@ -4601,13 +4601,13 @@
   <p:clrMapOvr>
     <a:masterClrMapping/>
   </p:clrMapOvr>
-  <mc:AlternateContent xmlns:mc="http://schemas.openxmlformats.org/markup-compatibility/2006">
-    <mc:Choice xmlns:p159="http://schemas.microsoft.com/office/powerpoint/2015/09/main" Requires="p159">
+  <mc:AlternateContent xmlns:mc="http://schemas.openxmlformats.org/markup-compatibility/2006" xmlns:p159="http://schemas.microsoft.com/office/powerpoint/2015/09/main">
+    <mc:Choice Requires="p159">
       <p:transition xmlns:p14="http://schemas.microsoft.com/office/powerpoint/2010/main" spd="slow" p14:dur="2000">
         <p159:morph option="byObject"/>
       </p:transition>
     </mc:Choice>
-    <mc:Fallback>
+    <mc:Fallback xmlns="">
       <p:transition spd="slow">
         <p:fade/>
       </p:transition>
@@ -4679,13 +4679,13 @@
   <p:clrMapOvr>
     <a:masterClrMapping/>
   </p:clrMapOvr>
-  <mc:AlternateContent xmlns:mc="http://schemas.openxmlformats.org/markup-compatibility/2006">
-    <mc:Choice xmlns:p159="http://schemas.microsoft.com/office/powerpoint/2015/09/main" Requires="p159">
+  <mc:AlternateContent xmlns:mc="http://schemas.openxmlformats.org/markup-compatibility/2006" xmlns:p159="http://schemas.microsoft.com/office/powerpoint/2015/09/main">
+    <mc:Choice Requires="p159">
       <p:transition xmlns:p14="http://schemas.microsoft.com/office/powerpoint/2010/main" spd="slow" p14:dur="2000">
         <p159:morph option="byObject"/>
       </p:transition>
     </mc:Choice>
-    <mc:Fallback>
+    <mc:Fallback xmlns="">
       <p:transition spd="slow">
         <p:fade/>
       </p:transition>
@@ -4955,6 +4955,302 @@
           </p:spPr>
         </p:pic>
       </p:grpSp>
+      <p:pic>
+        <p:nvPicPr>
+          <p:cNvPr id="6" name="Imagen 5" descr="Un hombre con lentes y camiseta negra&#10;&#10;Descripción generada automáticamente">
+            <a:extLst>
+              <a:ext uri="{FF2B5EF4-FFF2-40B4-BE49-F238E27FC236}">
+                <a16:creationId xmlns:a16="http://schemas.microsoft.com/office/drawing/2014/main" id="{E6AD576E-56B3-4DB9-86CD-7F3B26E9B3C5}"/>
+              </a:ext>
+            </a:extLst>
+          </p:cNvPr>
+          <p:cNvPicPr>
+            <a:picLocks noChangeAspect="1"/>
+          </p:cNvPicPr>
+          <p:nvPr/>
+        </p:nvPicPr>
+        <p:blipFill rotWithShape="1">
+          <a:blip r:embed="rId7"/>
+          <a:srcRect l="26570" r="23696"/>
+          <a:stretch/>
+        </p:blipFill>
+        <p:spPr>
+          <a:xfrm>
+            <a:off x="675088" y="2514923"/>
+            <a:ext cx="1707354" cy="2276472"/>
+          </a:xfrm>
+          <a:prstGeom prst="rect">
+            <a:avLst/>
+          </a:prstGeom>
+          <a:ln>
+            <a:noFill/>
+          </a:ln>
+          <a:effectLst>
+            <a:outerShdw blurRad="292100" dist="139700" dir="2700000" algn="tl" rotWithShape="0">
+              <a:srgbClr val="333333">
+                <a:alpha val="65000"/>
+              </a:srgbClr>
+            </a:outerShdw>
+          </a:effectLst>
+        </p:spPr>
+      </p:pic>
+      <p:pic>
+        <p:nvPicPr>
+          <p:cNvPr id="9" name="Imagen 8" descr="Un hombre con una camisa negra&#10;&#10;Descripción generada automáticamente">
+            <a:extLst>
+              <a:ext uri="{FF2B5EF4-FFF2-40B4-BE49-F238E27FC236}">
+                <a16:creationId xmlns:a16="http://schemas.microsoft.com/office/drawing/2014/main" id="{3C66BBCA-C314-39D3-B91C-865471F68976}"/>
+              </a:ext>
+            </a:extLst>
+          </p:cNvPr>
+          <p:cNvPicPr>
+            <a:picLocks noChangeAspect="1"/>
+          </p:cNvPicPr>
+          <p:nvPr/>
+        </p:nvPicPr>
+        <p:blipFill rotWithShape="1">
+          <a:blip r:embed="rId8"/>
+          <a:srcRect l="23219" r="27047"/>
+          <a:stretch/>
+        </p:blipFill>
+        <p:spPr>
+          <a:xfrm>
+            <a:off x="2994423" y="2514923"/>
+            <a:ext cx="1707354" cy="2276472"/>
+          </a:xfrm>
+          <a:prstGeom prst="rect">
+            <a:avLst/>
+          </a:prstGeom>
+          <a:ln>
+            <a:noFill/>
+          </a:ln>
+          <a:effectLst>
+            <a:outerShdw blurRad="292100" dist="139700" dir="2700000" algn="tl" rotWithShape="0">
+              <a:srgbClr val="333333">
+                <a:alpha val="65000"/>
+              </a:srgbClr>
+            </a:outerShdw>
+          </a:effectLst>
+        </p:spPr>
+      </p:pic>
+      <p:pic>
+        <p:nvPicPr>
+          <p:cNvPr id="11" name="Imagen 10" descr="Un hombre con una camisa negra&#10;&#10;Descripción generada automáticamente">
+            <a:extLst>
+              <a:ext uri="{FF2B5EF4-FFF2-40B4-BE49-F238E27FC236}">
+                <a16:creationId xmlns:a16="http://schemas.microsoft.com/office/drawing/2014/main" id="{4AA2C179-4962-B5F9-3C87-10A6F3E90F53}"/>
+              </a:ext>
+            </a:extLst>
+          </p:cNvPr>
+          <p:cNvPicPr>
+            <a:picLocks noChangeAspect="1"/>
+          </p:cNvPicPr>
+          <p:nvPr/>
+        </p:nvPicPr>
+        <p:blipFill rotWithShape="1">
+          <a:blip r:embed="rId9"/>
+          <a:srcRect l="23241" r="27025"/>
+          <a:stretch/>
+        </p:blipFill>
+        <p:spPr>
+          <a:xfrm>
+            <a:off x="5270895" y="2514923"/>
+            <a:ext cx="1707354" cy="2276472"/>
+          </a:xfrm>
+          <a:prstGeom prst="rect">
+            <a:avLst/>
+          </a:prstGeom>
+        </p:spPr>
+      </p:pic>
+      <p:sp>
+        <p:nvSpPr>
+          <p:cNvPr id="12" name="CuadroTexto 11">
+            <a:extLst>
+              <a:ext uri="{FF2B5EF4-FFF2-40B4-BE49-F238E27FC236}">
+                <a16:creationId xmlns:a16="http://schemas.microsoft.com/office/drawing/2014/main" id="{89DB906A-488A-7118-3977-30794CF8BD74}"/>
+              </a:ext>
+            </a:extLst>
+          </p:cNvPr>
+          <p:cNvSpPr txBox="1"/>
+          <p:nvPr/>
+        </p:nvSpPr>
+        <p:spPr>
+          <a:xfrm>
+            <a:off x="675088" y="4972050"/>
+            <a:ext cx="1707354" cy="738664"/>
+          </a:xfrm>
+          <a:prstGeom prst="rect">
+            <a:avLst/>
+          </a:prstGeom>
+          <a:noFill/>
+        </p:spPr>
+        <p:txBody>
+          <a:bodyPr wrap="square" rtlCol="0">
+            <a:spAutoFit/>
+          </a:bodyPr>
+          <a:lstStyle>
+            <a:defPPr>
+              <a:defRPr lang="es-CO"/>
+            </a:defPPr>
+            <a:lvl1pPr algn="ctr">
+              <a:defRPr sz="1600">
+                <a:latin typeface="+mj-lt"/>
+              </a:defRPr>
+            </a:lvl1pPr>
+          </a:lstStyle>
+          <a:p>
+            <a:r>
+              <a:rPr lang="es-ES" dirty="0" err="1"/>
+              <a:t>Ethiem</a:t>
+            </a:r>
+            <a:r>
+              <a:rPr lang="es-ES" dirty="0"/>
+              <a:t> Guerrero</a:t>
+            </a:r>
+          </a:p>
+          <a:p>
+            <a:r>
+              <a:rPr lang="es-ES" dirty="0"/>
+              <a:t>Full </a:t>
+            </a:r>
+            <a:r>
+              <a:rPr lang="es-ES" dirty="0" err="1"/>
+              <a:t>Stack</a:t>
+            </a:r>
+            <a:r>
+              <a:rPr lang="es-ES" dirty="0"/>
+              <a:t> / </a:t>
+            </a:r>
+            <a:r>
+              <a:rPr lang="es-ES" dirty="0" err="1"/>
+              <a:t>Developer</a:t>
+            </a:r>
+            <a:endParaRPr lang="es-CO" dirty="0"/>
+          </a:p>
+        </p:txBody>
+      </p:sp>
+      <p:sp>
+        <p:nvSpPr>
+          <p:cNvPr id="13" name="CuadroTexto 12">
+            <a:extLst>
+              <a:ext uri="{FF2B5EF4-FFF2-40B4-BE49-F238E27FC236}">
+                <a16:creationId xmlns:a16="http://schemas.microsoft.com/office/drawing/2014/main" id="{8574691A-EECC-F23D-B8F7-2A2B17CDF890}"/>
+              </a:ext>
+            </a:extLst>
+          </p:cNvPr>
+          <p:cNvSpPr txBox="1"/>
+          <p:nvPr/>
+        </p:nvSpPr>
+        <p:spPr>
+          <a:xfrm>
+            <a:off x="2994423" y="4986593"/>
+            <a:ext cx="1707354" cy="738664"/>
+          </a:xfrm>
+          <a:prstGeom prst="rect">
+            <a:avLst/>
+          </a:prstGeom>
+          <a:noFill/>
+        </p:spPr>
+        <p:txBody>
+          <a:bodyPr wrap="square" rtlCol="0">
+            <a:spAutoFit/>
+          </a:bodyPr>
+          <a:lstStyle>
+            <a:defPPr>
+              <a:defRPr lang="es-CO"/>
+            </a:defPPr>
+            <a:lvl1pPr algn="ctr">
+              <a:defRPr sz="1600">
+                <a:latin typeface="+mj-lt"/>
+              </a:defRPr>
+            </a:lvl1pPr>
+          </a:lstStyle>
+          <a:p>
+            <a:r>
+              <a:rPr lang="es-ES" dirty="0"/>
+              <a:t>Moisés Pineda</a:t>
+            </a:r>
+          </a:p>
+          <a:p>
+            <a:r>
+              <a:rPr lang="es-ES" dirty="0"/>
+              <a:t>Full </a:t>
+            </a:r>
+            <a:r>
+              <a:rPr lang="es-ES" dirty="0" err="1"/>
+              <a:t>Stack</a:t>
+            </a:r>
+            <a:r>
+              <a:rPr lang="es-ES" dirty="0"/>
+              <a:t> / </a:t>
+            </a:r>
+            <a:r>
+              <a:rPr lang="es-ES" dirty="0" err="1"/>
+              <a:t>Developer</a:t>
+            </a:r>
+            <a:endParaRPr lang="es-CO" dirty="0"/>
+          </a:p>
+        </p:txBody>
+      </p:sp>
+      <p:sp>
+        <p:nvSpPr>
+          <p:cNvPr id="14" name="CuadroTexto 13">
+            <a:extLst>
+              <a:ext uri="{FF2B5EF4-FFF2-40B4-BE49-F238E27FC236}">
+                <a16:creationId xmlns:a16="http://schemas.microsoft.com/office/drawing/2014/main" id="{181B400B-C5EF-307F-33A1-19A0889DEF51}"/>
+              </a:ext>
+            </a:extLst>
+          </p:cNvPr>
+          <p:cNvSpPr txBox="1"/>
+          <p:nvPr/>
+        </p:nvSpPr>
+        <p:spPr>
+          <a:xfrm>
+            <a:off x="5270895" y="4956195"/>
+            <a:ext cx="1707354" cy="523220"/>
+          </a:xfrm>
+          <a:prstGeom prst="rect">
+            <a:avLst/>
+          </a:prstGeom>
+          <a:noFill/>
+        </p:spPr>
+        <p:txBody>
+          <a:bodyPr wrap="square" rtlCol="0">
+            <a:spAutoFit/>
+          </a:bodyPr>
+          <a:lstStyle>
+            <a:defPPr>
+              <a:defRPr lang="es-CO"/>
+            </a:defPPr>
+            <a:lvl1pPr algn="ctr">
+              <a:defRPr sz="1600">
+                <a:latin typeface="+mj-lt"/>
+              </a:defRPr>
+            </a:lvl1pPr>
+          </a:lstStyle>
+          <a:p>
+            <a:r>
+              <a:rPr lang="es-ES" dirty="0"/>
+              <a:t>Brayan Medina</a:t>
+            </a:r>
+          </a:p>
+          <a:p>
+            <a:r>
+              <a:rPr lang="es-ES" dirty="0" err="1"/>
+              <a:t>Backend</a:t>
+            </a:r>
+            <a:r>
+              <a:rPr lang="es-ES" dirty="0"/>
+              <a:t> / </a:t>
+            </a:r>
+            <a:r>
+              <a:rPr lang="es-ES" dirty="0" err="1"/>
+              <a:t>Developer</a:t>
+            </a:r>
+            <a:endParaRPr lang="es-CO" dirty="0"/>
+          </a:p>
+        </p:txBody>
+      </p:sp>
     </p:spTree>
     <p:extLst>
       <p:ext uri="{BB962C8B-B14F-4D97-AF65-F5344CB8AC3E}">
@@ -4965,13 +5261,13 @@
   <p:clrMapOvr>
     <a:masterClrMapping/>
   </p:clrMapOvr>
-  <mc:AlternateContent xmlns:mc="http://schemas.openxmlformats.org/markup-compatibility/2006">
-    <mc:Choice xmlns:p159="http://schemas.microsoft.com/office/powerpoint/2015/09/main" Requires="p159">
+  <mc:AlternateContent xmlns:mc="http://schemas.openxmlformats.org/markup-compatibility/2006" xmlns:p159="http://schemas.microsoft.com/office/powerpoint/2015/09/main">
+    <mc:Choice Requires="p159">
       <p:transition xmlns:p14="http://schemas.microsoft.com/office/powerpoint/2010/main" spd="slow" p14:dur="2000">
         <p159:morph option="byObject"/>
       </p:transition>
     </mc:Choice>
-    <mc:Fallback>
+    <mc:Fallback xmlns="">
       <p:transition spd="slow">
         <p:fade/>
       </p:transition>
@@ -5357,13 +5653,13 @@
   <p:clrMapOvr>
     <a:masterClrMapping/>
   </p:clrMapOvr>
-  <mc:AlternateContent xmlns:mc="http://schemas.openxmlformats.org/markup-compatibility/2006">
-    <mc:Choice xmlns:p159="http://schemas.microsoft.com/office/powerpoint/2015/09/main" Requires="p159">
+  <mc:AlternateContent xmlns:mc="http://schemas.openxmlformats.org/markup-compatibility/2006" xmlns:p159="http://schemas.microsoft.com/office/powerpoint/2015/09/main">
+    <mc:Choice Requires="p159">
       <p:transition xmlns:p14="http://schemas.microsoft.com/office/powerpoint/2010/main" spd="slow" p14:dur="2000">
         <p159:morph option="byObject"/>
       </p:transition>
     </mc:Choice>
-    <mc:Fallback>
+    <mc:Fallback xmlns="">
       <p:transition spd="slow">
         <p:fade/>
       </p:transition>
@@ -5684,13 +5980,13 @@
   <p:clrMapOvr>
     <a:masterClrMapping/>
   </p:clrMapOvr>
-  <mc:AlternateContent xmlns:mc="http://schemas.openxmlformats.org/markup-compatibility/2006">
-    <mc:Choice xmlns:p159="http://schemas.microsoft.com/office/powerpoint/2015/09/main" Requires="p159">
+  <mc:AlternateContent xmlns:mc="http://schemas.openxmlformats.org/markup-compatibility/2006" xmlns:p159="http://schemas.microsoft.com/office/powerpoint/2015/09/main">
+    <mc:Choice Requires="p159">
       <p:transition xmlns:p14="http://schemas.microsoft.com/office/powerpoint/2010/main" spd="slow" p14:dur="2000">
         <p159:morph option="byObject"/>
       </p:transition>
     </mc:Choice>
-    <mc:Fallback>
+    <mc:Fallback xmlns="">
       <p:transition spd="slow">
         <p:fade/>
       </p:transition>
@@ -6041,13 +6337,13 @@
   <p:clrMapOvr>
     <a:masterClrMapping/>
   </p:clrMapOvr>
-  <mc:AlternateContent xmlns:mc="http://schemas.openxmlformats.org/markup-compatibility/2006">
-    <mc:Choice xmlns:p159="http://schemas.microsoft.com/office/powerpoint/2015/09/main" Requires="p159">
+  <mc:AlternateContent xmlns:mc="http://schemas.openxmlformats.org/markup-compatibility/2006" xmlns:p159="http://schemas.microsoft.com/office/powerpoint/2015/09/main">
+    <mc:Choice Requires="p159">
       <p:transition xmlns:p14="http://schemas.microsoft.com/office/powerpoint/2010/main" spd="slow" p14:dur="2000">
         <p159:morph option="byObject"/>
       </p:transition>
     </mc:Choice>
-    <mc:Fallback>
+    <mc:Fallback xmlns="">
       <p:transition spd="slow">
         <p:fade/>
       </p:transition>
@@ -6761,13 +7057,13 @@
   <p:clrMapOvr>
     <a:masterClrMapping/>
   </p:clrMapOvr>
-  <mc:AlternateContent xmlns:mc="http://schemas.openxmlformats.org/markup-compatibility/2006">
-    <mc:Choice xmlns:p159="http://schemas.microsoft.com/office/powerpoint/2015/09/main" Requires="p159">
+  <mc:AlternateContent xmlns:mc="http://schemas.openxmlformats.org/markup-compatibility/2006" xmlns:p159="http://schemas.microsoft.com/office/powerpoint/2015/09/main">
+    <mc:Choice Requires="p159">
       <p:transition xmlns:p14="http://schemas.microsoft.com/office/powerpoint/2010/main" spd="slow" p14:dur="2000">
         <p159:morph option="byObject"/>
       </p:transition>
     </mc:Choice>
-    <mc:Fallback>
+    <mc:Fallback xmlns="">
       <p:transition spd="slow">
         <p:fade/>
       </p:transition>
@@ -7080,13 +7376,13 @@
   <p:clrMapOvr>
     <a:masterClrMapping/>
   </p:clrMapOvr>
-  <mc:AlternateContent xmlns:mc="http://schemas.openxmlformats.org/markup-compatibility/2006">
-    <mc:Choice xmlns:p159="http://schemas.microsoft.com/office/powerpoint/2015/09/main" Requires="p159">
+  <mc:AlternateContent xmlns:mc="http://schemas.openxmlformats.org/markup-compatibility/2006" xmlns:p159="http://schemas.microsoft.com/office/powerpoint/2015/09/main">
+    <mc:Choice Requires="p159">
       <p:transition xmlns:p14="http://schemas.microsoft.com/office/powerpoint/2010/main" spd="slow" p14:dur="2000">
         <p159:morph option="byObject"/>
       </p:transition>
     </mc:Choice>
-    <mc:Fallback>
+    <mc:Fallback xmlns="">
       <p:transition spd="slow">
         <p:fade/>
       </p:transition>
@@ -7339,13 +7635,13 @@
   <p:clrMapOvr>
     <a:masterClrMapping/>
   </p:clrMapOvr>
-  <mc:AlternateContent xmlns:mc="http://schemas.openxmlformats.org/markup-compatibility/2006">
-    <mc:Choice xmlns:p159="http://schemas.microsoft.com/office/powerpoint/2015/09/main" Requires="p159">
+  <mc:AlternateContent xmlns:mc="http://schemas.openxmlformats.org/markup-compatibility/2006" xmlns:p159="http://schemas.microsoft.com/office/powerpoint/2015/09/main">
+    <mc:Choice Requires="p159">
       <p:transition xmlns:p14="http://schemas.microsoft.com/office/powerpoint/2010/main" spd="slow" p14:dur="2000">
         <p159:morph option="byObject"/>
       </p:transition>
     </mc:Choice>
-    <mc:Fallback>
+    <mc:Fallback xmlns="">
       <p:transition spd="slow">
         <p:fade/>
       </p:transition>
@@ -7828,13 +8124,13 @@
   <p:clrMapOvr>
     <a:masterClrMapping/>
   </p:clrMapOvr>
-  <mc:AlternateContent xmlns:mc="http://schemas.openxmlformats.org/markup-compatibility/2006">
-    <mc:Choice xmlns:p159="http://schemas.microsoft.com/office/powerpoint/2015/09/main" Requires="p159">
+  <mc:AlternateContent xmlns:mc="http://schemas.openxmlformats.org/markup-compatibility/2006" xmlns:p159="http://schemas.microsoft.com/office/powerpoint/2015/09/main">
+    <mc:Choice Requires="p159">
       <p:transition xmlns:p14="http://schemas.microsoft.com/office/powerpoint/2010/main" spd="slow" p14:dur="2000">
         <p159:morph option="byObject"/>
       </p:transition>
     </mc:Choice>
-    <mc:Fallback>
+    <mc:Fallback xmlns="">
       <p:transition spd="slow">
         <p:fade/>
       </p:transition>

</xml_diff>

<commit_message>
Sebastian añadido a la presentacion
</commit_message>
<xml_diff>
--- a/Presentaciones del proyecto/Presentación de Proyecto Pitch1.pptx
+++ b/Presentaciones del proyecto/Presentación de Proyecto Pitch1.pptx
@@ -261,7 +261,7 @@
           <a:p>
             <a:fld id="{88369B9F-131C-2846-AB8F-CEE154B4CAEB}" type="datetimeFigureOut">
               <a:rPr lang="es-CO" smtClean="0"/>
-              <a:t>25/05/2023</a:t>
+              <a:t>26/05/2023</a:t>
             </a:fld>
             <a:endParaRPr lang="es-CO"/>
           </a:p>
@@ -438,7 +438,7 @@
           <a:p>
             <a:fld id="{9660CB96-A603-FF42-AE46-F5F75F80A67B}" type="datetimeFigureOut">
               <a:rPr lang="es-CO" smtClean="0"/>
-              <a:t>25/05/2023</a:t>
+              <a:t>26/05/2023</a:t>
             </a:fld>
             <a:endParaRPr lang="es-CO"/>
           </a:p>
@@ -939,7 +939,7 @@
           <a:p>
             <a:fld id="{BD986248-06F7-A441-A47A-264EBD310E11}" type="datetimeFigureOut">
               <a:rPr lang="es-CO" smtClean="0"/>
-              <a:t>25/05/2023</a:t>
+              <a:t>26/05/2023</a:t>
             </a:fld>
             <a:endParaRPr lang="es-CO"/>
           </a:p>
@@ -1139,7 +1139,7 @@
           <a:p>
             <a:fld id="{BD986248-06F7-A441-A47A-264EBD310E11}" type="datetimeFigureOut">
               <a:rPr lang="es-CO" smtClean="0"/>
-              <a:t>25/05/2023</a:t>
+              <a:t>26/05/2023</a:t>
             </a:fld>
             <a:endParaRPr lang="es-CO"/>
           </a:p>
@@ -1349,7 +1349,7 @@
           <a:p>
             <a:fld id="{BD986248-06F7-A441-A47A-264EBD310E11}" type="datetimeFigureOut">
               <a:rPr lang="es-CO" smtClean="0"/>
-              <a:t>25/05/2023</a:t>
+              <a:t>26/05/2023</a:t>
             </a:fld>
             <a:endParaRPr lang="es-CO"/>
           </a:p>
@@ -1612,7 +1612,7 @@
           <a:p>
             <a:fld id="{BD986248-06F7-A441-A47A-264EBD310E11}" type="datetimeFigureOut">
               <a:rPr lang="es-CO" smtClean="0"/>
-              <a:t>25/05/2023</a:t>
+              <a:t>26/05/2023</a:t>
             </a:fld>
             <a:endParaRPr lang="es-CO"/>
           </a:p>
@@ -1812,7 +1812,7 @@
           <a:p>
             <a:fld id="{BD986248-06F7-A441-A47A-264EBD310E11}" type="datetimeFigureOut">
               <a:rPr lang="es-CO" smtClean="0"/>
-              <a:t>25/05/2023</a:t>
+              <a:t>26/05/2023</a:t>
             </a:fld>
             <a:endParaRPr lang="es-CO"/>
           </a:p>
@@ -2088,7 +2088,7 @@
           <a:p>
             <a:fld id="{BD986248-06F7-A441-A47A-264EBD310E11}" type="datetimeFigureOut">
               <a:rPr lang="es-CO" smtClean="0"/>
-              <a:t>25/05/2023</a:t>
+              <a:t>26/05/2023</a:t>
             </a:fld>
             <a:endParaRPr lang="es-CO"/>
           </a:p>
@@ -2356,7 +2356,7 @@
           <a:p>
             <a:fld id="{BD986248-06F7-A441-A47A-264EBD310E11}" type="datetimeFigureOut">
               <a:rPr lang="es-CO" smtClean="0"/>
-              <a:t>25/05/2023</a:t>
+              <a:t>26/05/2023</a:t>
             </a:fld>
             <a:endParaRPr lang="es-CO"/>
           </a:p>
@@ -2771,7 +2771,7 @@
           <a:p>
             <a:fld id="{BD986248-06F7-A441-A47A-264EBD310E11}" type="datetimeFigureOut">
               <a:rPr lang="es-CO" smtClean="0"/>
-              <a:t>25/05/2023</a:t>
+              <a:t>26/05/2023</a:t>
             </a:fld>
             <a:endParaRPr lang="es-CO"/>
           </a:p>
@@ -2913,7 +2913,7 @@
           <a:p>
             <a:fld id="{BD986248-06F7-A441-A47A-264EBD310E11}" type="datetimeFigureOut">
               <a:rPr lang="es-CO" smtClean="0"/>
-              <a:t>25/05/2023</a:t>
+              <a:t>26/05/2023</a:t>
             </a:fld>
             <a:endParaRPr lang="es-CO"/>
           </a:p>
@@ -3026,7 +3026,7 @@
           <a:p>
             <a:fld id="{BD986248-06F7-A441-A47A-264EBD310E11}" type="datetimeFigureOut">
               <a:rPr lang="es-CO" smtClean="0"/>
-              <a:t>25/05/2023</a:t>
+              <a:t>26/05/2023</a:t>
             </a:fld>
             <a:endParaRPr lang="es-CO"/>
           </a:p>
@@ -3339,7 +3339,7 @@
           <a:p>
             <a:fld id="{BD986248-06F7-A441-A47A-264EBD310E11}" type="datetimeFigureOut">
               <a:rPr lang="es-CO" smtClean="0"/>
-              <a:t>25/05/2023</a:t>
+              <a:t>26/05/2023</a:t>
             </a:fld>
             <a:endParaRPr lang="es-CO"/>
           </a:p>
@@ -3628,7 +3628,7 @@
           <a:p>
             <a:fld id="{BD986248-06F7-A441-A47A-264EBD310E11}" type="datetimeFigureOut">
               <a:rPr lang="es-CO" smtClean="0"/>
-              <a:t>25/05/2023</a:t>
+              <a:t>26/05/2023</a:t>
             </a:fld>
             <a:endParaRPr lang="es-CO"/>
           </a:p>
@@ -3871,7 +3871,7 @@
           <a:p>
             <a:fld id="{BD986248-06F7-A441-A47A-264EBD310E11}" type="datetimeFigureOut">
               <a:rPr lang="es-CO" smtClean="0"/>
-              <a:t>25/05/2023</a:t>
+              <a:t>26/05/2023</a:t>
             </a:fld>
             <a:endParaRPr lang="es-CO"/>
           </a:p>
@@ -5076,7 +5076,7 @@
         </p:nvSpPr>
         <p:spPr>
           <a:xfrm>
-            <a:off x="675088" y="4972050"/>
+            <a:off x="675088" y="4956195"/>
             <a:ext cx="1707354" cy="738664"/>
           </a:xfrm>
           <a:prstGeom prst="rect">
@@ -5143,8 +5143,8 @@
         </p:nvSpPr>
         <p:spPr>
           <a:xfrm>
-            <a:off x="2994423" y="4986593"/>
-            <a:ext cx="1707354" cy="738664"/>
+            <a:off x="2994423" y="4956195"/>
+            <a:ext cx="1707354" cy="1077218"/>
           </a:xfrm>
           <a:prstGeom prst="rect">
             <a:avLst/>
@@ -5188,6 +5188,10 @@
               <a:rPr lang="es-ES" dirty="0" err="1"/>
               <a:t>Developer</a:t>
             </a:r>
+            <a:r>
+              <a:rPr lang="es-ES" dirty="0"/>
+              <a:t> – Scrum Master</a:t>
+            </a:r>
             <a:endParaRPr lang="es-CO" dirty="0"/>
           </a:p>
         </p:txBody>
@@ -5238,6 +5242,108 @@
             <a:r>
               <a:rPr lang="es-ES" dirty="0" err="1"/>
               <a:t>Backend</a:t>
+            </a:r>
+            <a:r>
+              <a:rPr lang="es-ES" dirty="0"/>
+              <a:t> / </a:t>
+            </a:r>
+            <a:r>
+              <a:rPr lang="es-ES" dirty="0" err="1"/>
+              <a:t>Developer</a:t>
+            </a:r>
+            <a:endParaRPr lang="es-CO" dirty="0"/>
+          </a:p>
+        </p:txBody>
+      </p:sp>
+      <p:pic>
+        <p:nvPicPr>
+          <p:cNvPr id="7" name="Imagen 6" descr="Un hombre con lentes y camiseta negra&#10;&#10;Descripción generada automáticamente">
+            <a:extLst>
+              <a:ext uri="{FF2B5EF4-FFF2-40B4-BE49-F238E27FC236}">
+                <a16:creationId xmlns:a16="http://schemas.microsoft.com/office/drawing/2014/main" id="{E168E1FE-53C4-0CA1-4060-20050B8A168C}"/>
+              </a:ext>
+            </a:extLst>
+          </p:cNvPr>
+          <p:cNvPicPr>
+            <a:picLocks noChangeAspect="1"/>
+          </p:cNvPicPr>
+          <p:nvPr/>
+        </p:nvPicPr>
+        <p:blipFill rotWithShape="1">
+          <a:blip r:embed="rId10"/>
+          <a:srcRect t="12500" b="12500"/>
+          <a:stretch/>
+        </p:blipFill>
+        <p:spPr>
+          <a:xfrm>
+            <a:off x="7745276" y="2514923"/>
+            <a:ext cx="1707354" cy="2276472"/>
+          </a:xfrm>
+          <a:prstGeom prst="rect">
+            <a:avLst/>
+          </a:prstGeom>
+          <a:ln>
+            <a:noFill/>
+          </a:ln>
+          <a:effectLst>
+            <a:outerShdw blurRad="292100" dist="139700" dir="2700000" algn="tl" rotWithShape="0">
+              <a:srgbClr val="333333">
+                <a:alpha val="65000"/>
+              </a:srgbClr>
+            </a:outerShdw>
+          </a:effectLst>
+        </p:spPr>
+      </p:pic>
+      <p:sp>
+        <p:nvSpPr>
+          <p:cNvPr id="10" name="CuadroTexto 9">
+            <a:extLst>
+              <a:ext uri="{FF2B5EF4-FFF2-40B4-BE49-F238E27FC236}">
+                <a16:creationId xmlns:a16="http://schemas.microsoft.com/office/drawing/2014/main" id="{E716EBD1-8740-ADE2-DDD9-80AA9A7F586D}"/>
+              </a:ext>
+            </a:extLst>
+          </p:cNvPr>
+          <p:cNvSpPr txBox="1"/>
+          <p:nvPr/>
+        </p:nvSpPr>
+        <p:spPr>
+          <a:xfrm>
+            <a:off x="7745276" y="4956195"/>
+            <a:ext cx="1707354" cy="830997"/>
+          </a:xfrm>
+          <a:prstGeom prst="rect">
+            <a:avLst/>
+          </a:prstGeom>
+          <a:noFill/>
+        </p:spPr>
+        <p:txBody>
+          <a:bodyPr wrap="square" rtlCol="0">
+            <a:spAutoFit/>
+          </a:bodyPr>
+          <a:lstStyle>
+            <a:defPPr>
+              <a:defRPr lang="es-CO"/>
+            </a:defPPr>
+            <a:lvl1pPr algn="ctr">
+              <a:defRPr sz="1600">
+                <a:latin typeface="+mj-lt"/>
+              </a:defRPr>
+            </a:lvl1pPr>
+          </a:lstStyle>
+          <a:p>
+            <a:r>
+              <a:rPr lang="es-ES" dirty="0" err="1"/>
+              <a:t>Sebastían</a:t>
+            </a:r>
+            <a:r>
+              <a:rPr lang="es-ES" dirty="0"/>
+              <a:t> García</a:t>
+            </a:r>
+          </a:p>
+          <a:p>
+            <a:r>
+              <a:rPr lang="es-ES" dirty="0" err="1"/>
+              <a:t>Frontend</a:t>
             </a:r>
             <a:r>
               <a:rPr lang="es-ES" dirty="0"/>

</xml_diff>